<commit_message>
Add Week 3 materials
</commit_message>
<xml_diff>
--- a/Week3/Slides/Week 3.pptx
+++ b/Week3/Slides/Week 3.pptx
@@ -156,7 +156,7 @@
   </p:defaultTextStyle>
   <p:extLst>
     <p:ext uri="{EFAFB233-063F-42B5-8137-9DF3F51BA10A}">
-      <p15:sldGuideLst xmlns:p15="http://schemas.microsoft.com/office/powerpoint/2012/main" xmlns="">
+      <p15:sldGuideLst xmlns="" xmlns:p15="http://schemas.microsoft.com/office/powerpoint/2012/main">
         <p15:guide id="1" orient="horz" pos="2160">
           <p15:clr>
             <a:srgbClr val="A4A3A4"/>
@@ -255,7 +255,7 @@
           <a:p>
             <a:fld id="{90AF4669-11A5-AA4B-ACB6-1CD3E71EA0D2}" type="datetimeFigureOut">
               <a:rPr lang="en-US" smtClean="0"/>
-              <a:t>4/13/14</a:t>
+              <a:t>4/14/14</a:t>
             </a:fld>
             <a:endParaRPr lang="en-US"/>
           </a:p>
@@ -813,7 +813,7 @@
           <a:p>
             <a:fld id="{C95D1B94-35C6-4950-B226-D68A01DA1DCF}" type="datetimeFigureOut">
               <a:rPr lang="en-US" smtClean="0"/>
-              <a:t>4/13/14</a:t>
+              <a:t>4/14/14</a:t>
             </a:fld>
             <a:endParaRPr lang="en-US"/>
           </a:p>
@@ -978,7 +978,7 @@
           <a:p>
             <a:fld id="{C95D1B94-35C6-4950-B226-D68A01DA1DCF}" type="datetimeFigureOut">
               <a:rPr lang="en-US" smtClean="0"/>
-              <a:t>4/13/14</a:t>
+              <a:t>4/14/14</a:t>
             </a:fld>
             <a:endParaRPr lang="en-US"/>
           </a:p>
@@ -1153,7 +1153,7 @@
           <a:p>
             <a:fld id="{C95D1B94-35C6-4950-B226-D68A01DA1DCF}" type="datetimeFigureOut">
               <a:rPr lang="en-US" smtClean="0"/>
-              <a:t>4/13/14</a:t>
+              <a:t>4/14/14</a:t>
             </a:fld>
             <a:endParaRPr lang="en-US"/>
           </a:p>
@@ -1336,7 +1336,7 @@
           <a:p>
             <a:fld id="{C95D1B94-35C6-4950-B226-D68A01DA1DCF}" type="datetimeFigureOut">
               <a:rPr lang="en-US" smtClean="0"/>
-              <a:t>4/13/14</a:t>
+              <a:t>4/14/14</a:t>
             </a:fld>
             <a:endParaRPr lang="en-US"/>
           </a:p>
@@ -1598,7 +1598,7 @@
           <a:p>
             <a:fld id="{C95D1B94-35C6-4950-B226-D68A01DA1DCF}" type="datetimeFigureOut">
               <a:rPr lang="en-US" smtClean="0"/>
-              <a:t>4/13/14</a:t>
+              <a:t>4/14/14</a:t>
             </a:fld>
             <a:endParaRPr lang="en-US"/>
           </a:p>
@@ -1946,7 +1946,7 @@
           <a:p>
             <a:fld id="{C95D1B94-35C6-4950-B226-D68A01DA1DCF}" type="datetimeFigureOut">
               <a:rPr lang="en-US" smtClean="0"/>
-              <a:t>4/13/14</a:t>
+              <a:t>4/14/14</a:t>
             </a:fld>
             <a:endParaRPr lang="en-US"/>
           </a:p>
@@ -2254,7 +2254,7 @@
           <a:p>
             <a:fld id="{C95D1B94-35C6-4950-B226-D68A01DA1DCF}" type="datetimeFigureOut">
               <a:rPr lang="en-US" smtClean="0"/>
-              <a:t>4/13/14</a:t>
+              <a:t>4/14/14</a:t>
             </a:fld>
             <a:endParaRPr lang="en-US"/>
           </a:p>
@@ -2481,7 +2481,7 @@
           <a:p>
             <a:fld id="{C95D1B94-35C6-4950-B226-D68A01DA1DCF}" type="datetimeFigureOut">
               <a:rPr lang="en-US" smtClean="0"/>
-              <a:t>4/13/14</a:t>
+              <a:t>4/14/14</a:t>
             </a:fld>
             <a:endParaRPr lang="en-US"/>
           </a:p>
@@ -2571,7 +2571,7 @@
           <a:p>
             <a:fld id="{C95D1B94-35C6-4950-B226-D68A01DA1DCF}" type="datetimeFigureOut">
               <a:rPr lang="en-US" smtClean="0"/>
-              <a:t>4/13/14</a:t>
+              <a:t>4/14/14</a:t>
             </a:fld>
             <a:endParaRPr lang="en-US"/>
           </a:p>
@@ -2859,7 +2859,7 @@
           <a:p>
             <a:fld id="{C95D1B94-35C6-4950-B226-D68A01DA1DCF}" type="datetimeFigureOut">
               <a:rPr lang="en-US" smtClean="0"/>
-              <a:t>4/13/14</a:t>
+              <a:t>4/14/14</a:t>
             </a:fld>
             <a:endParaRPr lang="en-US"/>
           </a:p>
@@ -3128,7 +3128,7 @@
           <a:p>
             <a:fld id="{C95D1B94-35C6-4950-B226-D68A01DA1DCF}" type="datetimeFigureOut">
               <a:rPr lang="en-US" smtClean="0"/>
-              <a:t>4/13/14</a:t>
+              <a:t>4/14/14</a:t>
             </a:fld>
             <a:endParaRPr lang="en-US"/>
           </a:p>
@@ -3338,7 +3338,7 @@
           <a:p>
             <a:fld id="{C95D1B94-35C6-4950-B226-D68A01DA1DCF}" type="datetimeFigureOut">
               <a:rPr lang="en-US" smtClean="0"/>
-              <a:t>4/13/14</a:t>
+              <a:t>4/14/14</a:t>
             </a:fld>
             <a:endParaRPr lang="en-US"/>
           </a:p>
@@ -9349,19 +9349,7 @@
                 </a:highlight>
                 <a:latin typeface="Consolas" panose="020B0609020204030204" pitchFamily="49" charset="0"/>
               </a:rPr>
-              <a:t>(</a:t>
-            </a:r>
-            <a:r>
-              <a:rPr lang="en-US" sz="1700" dirty="0" smtClean="0">
-                <a:solidFill>
-                  <a:srgbClr val="000000"/>
-                </a:solidFill>
-                <a:highlight>
-                  <a:srgbClr val="FFFFFF"/>
-                </a:highlight>
-                <a:latin typeface="Consolas" panose="020B0609020204030204" pitchFamily="49" charset="0"/>
-              </a:rPr>
-              <a:t>) {</a:t>
+              <a:t>() {</a:t>
             </a:r>
             <a:endParaRPr lang="en-US" sz="1700" dirty="0">
               <a:solidFill>
@@ -9604,23 +9592,7 @@
           <a:p>
             <a:r>
               <a:rPr lang="en-US" dirty="0" smtClean="0"/>
-              <a:t>Using </a:t>
-            </a:r>
-            <a:r>
-              <a:rPr lang="en-US" dirty="0" smtClean="0"/>
-              <a:t>a C++ Event  </a:t>
-            </a:r>
-            <a:r>
-              <a:rPr lang="en-US" dirty="0" smtClean="0"/>
-              <a:t>from C++ code </a:t>
-            </a:r>
-            <a:r>
-              <a:rPr lang="en-US" dirty="0" smtClean="0"/>
-              <a:t>is </a:t>
-            </a:r>
-            <a:r>
-              <a:rPr lang="en-US" dirty="0" smtClean="0"/>
-              <a:t>more work</a:t>
+              <a:t>Using a C++ Event  from C++ code is more work</a:t>
             </a:r>
           </a:p>
           <a:p>
@@ -12644,19 +12616,7 @@
                 </a:highlight>
                 <a:latin typeface="Consolas" panose="020B0609020204030204" pitchFamily="49" charset="0"/>
               </a:rPr>
-              <a:t>        .</a:t>
-            </a:r>
-            <a:r>
-              <a:rPr lang="en-US" sz="1600" dirty="0" smtClean="0">
-                <a:solidFill>
-                  <a:srgbClr val="000000"/>
-                </a:solidFill>
-                <a:highlight>
-                  <a:srgbClr val="FFFFFF"/>
-                </a:highlight>
-                <a:latin typeface="Consolas" panose="020B0609020204030204" pitchFamily="49" charset="0"/>
-              </a:rPr>
-              <a:t>..</a:t>
+              <a:t>        ...</a:t>
             </a:r>
             <a:endParaRPr lang="en-US" sz="1600" dirty="0">
               <a:solidFill>
@@ -14051,27 +14011,7 @@
           <a:p>
             <a:r>
               <a:rPr lang="en-US" dirty="0" smtClean="0"/>
-              <a:t>Callback </a:t>
-            </a:r>
-            <a:r>
-              <a:rPr lang="en-US" dirty="0" smtClean="0"/>
-              <a:t>arguments </a:t>
-            </a:r>
-            <a:r>
-              <a:rPr lang="en-US" dirty="0" smtClean="0"/>
-              <a:t>to functions </a:t>
-            </a:r>
-            <a:r>
-              <a:rPr lang="en-US" dirty="0" smtClean="0"/>
-              <a:t>turned </a:t>
-            </a:r>
-            <a:r>
-              <a:rPr lang="en-US" dirty="0" smtClean="0"/>
-              <a:t>into lambdas</a:t>
-            </a:r>
-            <a:r>
-              <a:rPr lang="en-US" dirty="0" smtClean="0"/>
-              <a:t>:</a:t>
+              <a:t>Callback arguments to functions turned into lambdas:</a:t>
             </a:r>
           </a:p>
           <a:p>
@@ -14080,7 +14020,6 @@
               <a:rPr lang="en-US" dirty="0" smtClean="0"/>
               <a:t>Yes, this is ugly, so we will try to architect our code in other ways</a:t>
             </a:r>
-            <a:endParaRPr lang="en-US" dirty="0" smtClean="0"/>
           </a:p>
           <a:p>
             <a:pPr lvl="1"/>
@@ -16527,17 +16466,8 @@
             <a:pPr lvl="1"/>
             <a:r>
               <a:rPr lang="en-US" dirty="0" smtClean="0"/>
-              <a:t>We can do it </a:t>
-            </a:r>
-            <a:r>
-              <a:rPr lang="en-US" dirty="0" smtClean="0"/>
-              <a:t>manually</a:t>
-            </a:r>
-            <a:r>
-              <a:rPr lang="en-US" dirty="0" smtClean="0"/>
-              <a:t> now, because we love doing things manually!</a:t>
-            </a:r>
-            <a:endParaRPr lang="en-US" dirty="0" smtClean="0"/>
+              <a:t>We can do it manually now, because we love doing things manually!</a:t>
+            </a:r>
           </a:p>
         </p:txBody>
       </p:sp>
@@ -16994,7 +16924,6 @@
               <a:rPr lang="en-US" dirty="0" smtClean="0"/>
               <a:t>!</a:t>
             </a:r>
-            <a:endParaRPr lang="en-US" dirty="0" smtClean="0"/>
           </a:p>
           <a:p>
             <a:pPr lvl="2"/>
@@ -17021,13 +16950,8 @@
             <a:pPr lvl="1"/>
             <a:r>
               <a:rPr lang="en-US" dirty="0" smtClean="0"/>
-              <a:t>In short, try to compartmentalize your </a:t>
-            </a:r>
-            <a:r>
-              <a:rPr lang="en-US" dirty="0" smtClean="0"/>
-              <a:t>threads as much as possible</a:t>
-            </a:r>
-            <a:endParaRPr lang="en-US" dirty="0" smtClean="0"/>
+              <a:t>In short, try to compartmentalize your threads as much as possible</a:t>
+            </a:r>
           </a:p>
           <a:p>
             <a:pPr lvl="1"/>
@@ -17126,15 +17050,7 @@
             <a:pPr lvl="1"/>
             <a:r>
               <a:rPr lang="en-US" dirty="0" smtClean="0"/>
-              <a:t>This is good, because </a:t>
-            </a:r>
-            <a:r>
-              <a:rPr lang="en-US" dirty="0" smtClean="0"/>
-              <a:t>now that we </a:t>
-            </a:r>
-            <a:r>
-              <a:rPr lang="en-US" dirty="0" smtClean="0"/>
-              <a:t>are, the following topics will be easy</a:t>
+              <a:t>This is good, because now that we are, the following topics will be easy</a:t>
             </a:r>
           </a:p>
           <a:p>
@@ -20795,7 +20711,6 @@
               <a:rPr lang="en-US" dirty="0" smtClean="0"/>
               <a:t>Sensors Galore</a:t>
             </a:r>
-            <a:endParaRPr lang="en-US" dirty="0" smtClean="0"/>
           </a:p>
           <a:p>
             <a:pPr lvl="1"/>
@@ -23200,11 +23115,7 @@
             <a:pPr lvl="1"/>
             <a:r>
               <a:rPr lang="en-US" dirty="0" smtClean="0"/>
-              <a:t>Avoid clicks by knowing your ending phase from last buffer, and starting with that phase in the next </a:t>
-            </a:r>
-            <a:r>
-              <a:rPr lang="en-US" dirty="0" smtClean="0"/>
-              <a:t>buffer</a:t>
+              <a:t>Avoid clicks by knowing your ending phase from last buffer, and starting with that phase in the next buffer</a:t>
             </a:r>
           </a:p>
           <a:p>
@@ -23897,7 +23808,6 @@
               <a:rPr lang="en-US" dirty="0" smtClean="0"/>
               <a:t>!</a:t>
             </a:r>
-            <a:endParaRPr lang="en-US" dirty="0" smtClean="0"/>
           </a:p>
           <a:p>
             <a:pPr lvl="2"/>

</xml_diff>